<commit_message>
Update activity diagrams for conversation with AI
</commit_message>
<xml_diff>
--- a/spec/documents/eventFlow.pptx
+++ b/spec/documents/eventFlow.pptx
@@ -298,7 +298,7 @@
           <a:p>
             <a:fld id="{88C963D9-D4AF-4211-B3E7-23510E779024}" type="datetimeFigureOut">
               <a:rPr kumimoji="1" lang="ja-JP" altLang="en-US" smtClean="0"/>
-              <a:t>2024/5/10</a:t>
+              <a:t>2024/5/13</a:t>
             </a:fld>
             <a:endParaRPr kumimoji="1" lang="ja-JP" altLang="en-US"/>
           </a:p>
@@ -528,7 +528,7 @@
           <a:p>
             <a:fld id="{88C963D9-D4AF-4211-B3E7-23510E779024}" type="datetimeFigureOut">
               <a:rPr kumimoji="1" lang="ja-JP" altLang="en-US" smtClean="0"/>
-              <a:t>2024/5/10</a:t>
+              <a:t>2024/5/13</a:t>
             </a:fld>
             <a:endParaRPr kumimoji="1" lang="ja-JP" altLang="en-US"/>
           </a:p>
@@ -768,7 +768,7 @@
           <a:p>
             <a:fld id="{88C963D9-D4AF-4211-B3E7-23510E779024}" type="datetimeFigureOut">
               <a:rPr kumimoji="1" lang="ja-JP" altLang="en-US" smtClean="0"/>
-              <a:t>2024/5/10</a:t>
+              <a:t>2024/5/13</a:t>
             </a:fld>
             <a:endParaRPr kumimoji="1" lang="ja-JP" altLang="en-US"/>
           </a:p>
@@ -998,7 +998,7 @@
           <a:p>
             <a:fld id="{88C963D9-D4AF-4211-B3E7-23510E779024}" type="datetimeFigureOut">
               <a:rPr kumimoji="1" lang="ja-JP" altLang="en-US" smtClean="0"/>
-              <a:t>2024/5/10</a:t>
+              <a:t>2024/5/13</a:t>
             </a:fld>
             <a:endParaRPr kumimoji="1" lang="ja-JP" altLang="en-US"/>
           </a:p>
@@ -1273,7 +1273,7 @@
           <a:p>
             <a:fld id="{88C963D9-D4AF-4211-B3E7-23510E779024}" type="datetimeFigureOut">
               <a:rPr kumimoji="1" lang="ja-JP" altLang="en-US" smtClean="0"/>
-              <a:t>2024/5/10</a:t>
+              <a:t>2024/5/13</a:t>
             </a:fld>
             <a:endParaRPr kumimoji="1" lang="ja-JP" altLang="en-US"/>
           </a:p>
@@ -1602,7 +1602,7 @@
           <a:p>
             <a:fld id="{88C963D9-D4AF-4211-B3E7-23510E779024}" type="datetimeFigureOut">
               <a:rPr kumimoji="1" lang="ja-JP" altLang="en-US" smtClean="0"/>
-              <a:t>2024/5/10</a:t>
+              <a:t>2024/5/13</a:t>
             </a:fld>
             <a:endParaRPr kumimoji="1" lang="ja-JP" altLang="en-US"/>
           </a:p>
@@ -2078,7 +2078,7 @@
           <a:p>
             <a:fld id="{88C963D9-D4AF-4211-B3E7-23510E779024}" type="datetimeFigureOut">
               <a:rPr kumimoji="1" lang="ja-JP" altLang="en-US" smtClean="0"/>
-              <a:t>2024/5/10</a:t>
+              <a:t>2024/5/13</a:t>
             </a:fld>
             <a:endParaRPr kumimoji="1" lang="ja-JP" altLang="en-US"/>
           </a:p>
@@ -2219,7 +2219,7 @@
           <a:p>
             <a:fld id="{88C963D9-D4AF-4211-B3E7-23510E779024}" type="datetimeFigureOut">
               <a:rPr kumimoji="1" lang="ja-JP" altLang="en-US" smtClean="0"/>
-              <a:t>2024/5/10</a:t>
+              <a:t>2024/5/13</a:t>
             </a:fld>
             <a:endParaRPr kumimoji="1" lang="ja-JP" altLang="en-US"/>
           </a:p>
@@ -2332,7 +2332,7 @@
           <a:p>
             <a:fld id="{88C963D9-D4AF-4211-B3E7-23510E779024}" type="datetimeFigureOut">
               <a:rPr kumimoji="1" lang="ja-JP" altLang="en-US" smtClean="0"/>
-              <a:t>2024/5/10</a:t>
+              <a:t>2024/5/13</a:t>
             </a:fld>
             <a:endParaRPr kumimoji="1" lang="ja-JP" altLang="en-US"/>
           </a:p>
@@ -2675,7 +2675,7 @@
           <a:p>
             <a:fld id="{88C963D9-D4AF-4211-B3E7-23510E779024}" type="datetimeFigureOut">
               <a:rPr kumimoji="1" lang="ja-JP" altLang="en-US" smtClean="0"/>
-              <a:t>2024/5/10</a:t>
+              <a:t>2024/5/13</a:t>
             </a:fld>
             <a:endParaRPr kumimoji="1" lang="ja-JP" altLang="en-US"/>
           </a:p>
@@ -2963,7 +2963,7 @@
           <a:p>
             <a:fld id="{88C963D9-D4AF-4211-B3E7-23510E779024}" type="datetimeFigureOut">
               <a:rPr kumimoji="1" lang="ja-JP" altLang="en-US" smtClean="0"/>
-              <a:t>2024/5/10</a:t>
+              <a:t>2024/5/13</a:t>
             </a:fld>
             <a:endParaRPr kumimoji="1" lang="ja-JP" altLang="en-US"/>
           </a:p>
@@ -3236,7 +3236,7 @@
           <a:p>
             <a:fld id="{88C963D9-D4AF-4211-B3E7-23510E779024}" type="datetimeFigureOut">
               <a:rPr kumimoji="1" lang="ja-JP" altLang="en-US" smtClean="0"/>
-              <a:t>2024/5/10</a:t>
+              <a:t>2024/5/13</a:t>
             </a:fld>
             <a:endParaRPr kumimoji="1" lang="ja-JP" altLang="en-US"/>
           </a:p>
@@ -5594,7 +5594,7 @@
           <p:nvPr>
             <p:extLst>
               <p:ext uri="{D42A27DB-BD31-4B8C-83A1-F6EECF244321}">
-                <p14:modId xmlns:p14="http://schemas.microsoft.com/office/powerpoint/2010/main" val="2256205933"/>
+                <p14:modId xmlns:p14="http://schemas.microsoft.com/office/powerpoint/2010/main" val="1441590222"/>
               </p:ext>
             </p:extLst>
           </p:nvPr>
@@ -5879,7 +5879,7 @@
                       </a:r>
                       <a:r>
                         <a:rPr kumimoji="1" lang="ja-JP" altLang="en-US" sz="1800" dirty="0"/>
-                        <a:t>から受け取ったデータを格納し，可視化されたデータを須臾力する．</a:t>
+                        <a:t>から受け取ったデータを格納し，可視化されたデータを「感情分析結果を表示する画面」に出力する．</a:t>
                       </a:r>
                       <a:endParaRPr kumimoji="1" lang="en-US" altLang="ja-JP" sz="1800" dirty="0"/>
                     </a:p>
@@ -8874,14 +8874,14 @@
           <p:nvPr>
             <p:extLst>
               <p:ext uri="{D42A27DB-BD31-4B8C-83A1-F6EECF244321}">
-                <p14:modId xmlns:p14="http://schemas.microsoft.com/office/powerpoint/2010/main" val="618505140"/>
+                <p14:modId xmlns:p14="http://schemas.microsoft.com/office/powerpoint/2010/main" val="1571827414"/>
               </p:ext>
             </p:extLst>
           </p:nvPr>
         </p:nvGraphicFramePr>
         <p:xfrm>
           <a:off x="313268" y="248982"/>
-          <a:ext cx="11565467" cy="4820929"/>
+          <a:ext cx="11565467" cy="4546609"/>
         </p:xfrm>
         <a:graphic>
           <a:graphicData uri="http://schemas.openxmlformats.org/drawingml/2006/table">
@@ -9166,25 +9166,6 @@
                       <a:r>
                         <a:rPr kumimoji="1" lang="ja-JP" altLang="en-US" sz="1800" dirty="0"/>
                         <a:t>との会話内容を削除し，メイン画面を表示する．</a:t>
-                      </a:r>
-                      <a:endParaRPr kumimoji="1" lang="en-US" altLang="ja-JP" sz="1800" dirty="0"/>
-                    </a:p>
-                    <a:p>
-                      <a:pPr marL="342900" indent="-342900">
-                        <a:buFont typeface="+mj-lt"/>
-                        <a:buAutoNum type="arabicPeriod"/>
-                      </a:pPr>
-                      <a:r>
-                        <a:rPr kumimoji="1" lang="ja-JP" altLang="en-US" sz="1800" dirty="0"/>
-                        <a:t>システムは，感情分析</a:t>
-                      </a:r>
-                      <a:r>
-                        <a:rPr kumimoji="1" lang="en-US" altLang="ja-JP" sz="1800" dirty="0"/>
-                        <a:t>AI</a:t>
-                      </a:r>
-                      <a:r>
-                        <a:rPr kumimoji="1" lang="ja-JP" altLang="en-US" sz="1800" dirty="0"/>
-                        <a:t>から得た返答結果を出力する．</a:t>
                       </a:r>
                       <a:endParaRPr kumimoji="1" lang="en-US" altLang="ja-JP" sz="1800" dirty="0"/>
                     </a:p>

</xml_diff>

<commit_message>
chore: Update base.html and style.css for consistent styling
</commit_message>
<xml_diff>
--- a/spec/documents/eventFlow.pptx
+++ b/spec/documents/eventFlow.pptx
@@ -298,7 +298,7 @@
           <a:p>
             <a:fld id="{88C963D9-D4AF-4211-B3E7-23510E779024}" type="datetimeFigureOut">
               <a:rPr kumimoji="1" lang="ja-JP" altLang="en-US" smtClean="0"/>
-              <a:t>2024/5/13</a:t>
+              <a:t>2024/5/30</a:t>
             </a:fld>
             <a:endParaRPr kumimoji="1" lang="ja-JP" altLang="en-US"/>
           </a:p>
@@ -528,7 +528,7 @@
           <a:p>
             <a:fld id="{88C963D9-D4AF-4211-B3E7-23510E779024}" type="datetimeFigureOut">
               <a:rPr kumimoji="1" lang="ja-JP" altLang="en-US" smtClean="0"/>
-              <a:t>2024/5/13</a:t>
+              <a:t>2024/5/30</a:t>
             </a:fld>
             <a:endParaRPr kumimoji="1" lang="ja-JP" altLang="en-US"/>
           </a:p>
@@ -768,7 +768,7 @@
           <a:p>
             <a:fld id="{88C963D9-D4AF-4211-B3E7-23510E779024}" type="datetimeFigureOut">
               <a:rPr kumimoji="1" lang="ja-JP" altLang="en-US" smtClean="0"/>
-              <a:t>2024/5/13</a:t>
+              <a:t>2024/5/30</a:t>
             </a:fld>
             <a:endParaRPr kumimoji="1" lang="ja-JP" altLang="en-US"/>
           </a:p>
@@ -998,7 +998,7 @@
           <a:p>
             <a:fld id="{88C963D9-D4AF-4211-B3E7-23510E779024}" type="datetimeFigureOut">
               <a:rPr kumimoji="1" lang="ja-JP" altLang="en-US" smtClean="0"/>
-              <a:t>2024/5/13</a:t>
+              <a:t>2024/5/30</a:t>
             </a:fld>
             <a:endParaRPr kumimoji="1" lang="ja-JP" altLang="en-US"/>
           </a:p>
@@ -1273,7 +1273,7 @@
           <a:p>
             <a:fld id="{88C963D9-D4AF-4211-B3E7-23510E779024}" type="datetimeFigureOut">
               <a:rPr kumimoji="1" lang="ja-JP" altLang="en-US" smtClean="0"/>
-              <a:t>2024/5/13</a:t>
+              <a:t>2024/5/30</a:t>
             </a:fld>
             <a:endParaRPr kumimoji="1" lang="ja-JP" altLang="en-US"/>
           </a:p>
@@ -1602,7 +1602,7 @@
           <a:p>
             <a:fld id="{88C963D9-D4AF-4211-B3E7-23510E779024}" type="datetimeFigureOut">
               <a:rPr kumimoji="1" lang="ja-JP" altLang="en-US" smtClean="0"/>
-              <a:t>2024/5/13</a:t>
+              <a:t>2024/5/30</a:t>
             </a:fld>
             <a:endParaRPr kumimoji="1" lang="ja-JP" altLang="en-US"/>
           </a:p>
@@ -2078,7 +2078,7 @@
           <a:p>
             <a:fld id="{88C963D9-D4AF-4211-B3E7-23510E779024}" type="datetimeFigureOut">
               <a:rPr kumimoji="1" lang="ja-JP" altLang="en-US" smtClean="0"/>
-              <a:t>2024/5/13</a:t>
+              <a:t>2024/5/30</a:t>
             </a:fld>
             <a:endParaRPr kumimoji="1" lang="ja-JP" altLang="en-US"/>
           </a:p>
@@ -2219,7 +2219,7 @@
           <a:p>
             <a:fld id="{88C963D9-D4AF-4211-B3E7-23510E779024}" type="datetimeFigureOut">
               <a:rPr kumimoji="1" lang="ja-JP" altLang="en-US" smtClean="0"/>
-              <a:t>2024/5/13</a:t>
+              <a:t>2024/5/30</a:t>
             </a:fld>
             <a:endParaRPr kumimoji="1" lang="ja-JP" altLang="en-US"/>
           </a:p>
@@ -2332,7 +2332,7 @@
           <a:p>
             <a:fld id="{88C963D9-D4AF-4211-B3E7-23510E779024}" type="datetimeFigureOut">
               <a:rPr kumimoji="1" lang="ja-JP" altLang="en-US" smtClean="0"/>
-              <a:t>2024/5/13</a:t>
+              <a:t>2024/5/30</a:t>
             </a:fld>
             <a:endParaRPr kumimoji="1" lang="ja-JP" altLang="en-US"/>
           </a:p>
@@ -2675,7 +2675,7 @@
           <a:p>
             <a:fld id="{88C963D9-D4AF-4211-B3E7-23510E779024}" type="datetimeFigureOut">
               <a:rPr kumimoji="1" lang="ja-JP" altLang="en-US" smtClean="0"/>
-              <a:t>2024/5/13</a:t>
+              <a:t>2024/5/30</a:t>
             </a:fld>
             <a:endParaRPr kumimoji="1" lang="ja-JP" altLang="en-US"/>
           </a:p>
@@ -2963,7 +2963,7 @@
           <a:p>
             <a:fld id="{88C963D9-D4AF-4211-B3E7-23510E779024}" type="datetimeFigureOut">
               <a:rPr kumimoji="1" lang="ja-JP" altLang="en-US" smtClean="0"/>
-              <a:t>2024/5/13</a:t>
+              <a:t>2024/5/30</a:t>
             </a:fld>
             <a:endParaRPr kumimoji="1" lang="ja-JP" altLang="en-US"/>
           </a:p>
@@ -3236,7 +3236,7 @@
           <a:p>
             <a:fld id="{88C963D9-D4AF-4211-B3E7-23510E779024}" type="datetimeFigureOut">
               <a:rPr kumimoji="1" lang="ja-JP" altLang="en-US" smtClean="0"/>
-              <a:t>2024/5/13</a:t>
+              <a:t>2024/5/30</a:t>
             </a:fld>
             <a:endParaRPr kumimoji="1" lang="ja-JP" altLang="en-US"/>
           </a:p>
@@ -3637,7 +3637,7 @@
 </file>
 
 <file path=ppt/slides/slide1.xml><?xml version="1.0" encoding="utf-8"?>
-<p:sld xmlns:a="http://schemas.openxmlformats.org/drawingml/2006/main" xmlns:r="http://schemas.openxmlformats.org/officeDocument/2006/relationships" xmlns:p="http://schemas.openxmlformats.org/presentationml/2006/main">
+<p:sld xmlns:a="http://schemas.openxmlformats.org/drawingml/2006/main" xmlns:r="http://schemas.openxmlformats.org/officeDocument/2006/relationships" xmlns:p="http://schemas.openxmlformats.org/presentationml/2006/main" show="0">
   <p:cSld>
     <p:spTree>
       <p:nvGrpSpPr>
@@ -6001,7 +6001,7 @@
           <p:nvPr>
             <p:extLst>
               <p:ext uri="{D42A27DB-BD31-4B8C-83A1-F6EECF244321}">
-                <p14:modId xmlns:p14="http://schemas.microsoft.com/office/powerpoint/2010/main" val="3847276460"/>
+                <p14:modId xmlns:p14="http://schemas.microsoft.com/office/powerpoint/2010/main" val="748522989"/>
               </p:ext>
             </p:extLst>
           </p:nvPr>
@@ -6157,7 +6157,7 @@
                     <a:p>
                       <a:r>
                         <a:rPr kumimoji="1" lang="ja-JP" altLang="en-US" sz="1800" dirty="0"/>
-                        <a:t>なし</a:t>
+                        <a:t>メイン画面が表示されている</a:t>
                       </a:r>
                     </a:p>
                   </a:txBody>
@@ -6465,7 +6465,7 @@
           <p:nvPr>
             <p:extLst>
               <p:ext uri="{D42A27DB-BD31-4B8C-83A1-F6EECF244321}">
-                <p14:modId xmlns:p14="http://schemas.microsoft.com/office/powerpoint/2010/main" val="2853956993"/>
+                <p14:modId xmlns:p14="http://schemas.microsoft.com/office/powerpoint/2010/main" val="2035221008"/>
               </p:ext>
             </p:extLst>
           </p:nvPr>
@@ -6621,7 +6621,7 @@
                     <a:p>
                       <a:r>
                         <a:rPr kumimoji="1" lang="ja-JP" altLang="en-US" sz="1800" dirty="0"/>
-                        <a:t>なし</a:t>
+                        <a:t>メイン画面が表示されている</a:t>
                       </a:r>
                     </a:p>
                   </a:txBody>
@@ -6831,7 +6831,7 @@
           <p:nvPr>
             <p:extLst>
               <p:ext uri="{D42A27DB-BD31-4B8C-83A1-F6EECF244321}">
-                <p14:modId xmlns:p14="http://schemas.microsoft.com/office/powerpoint/2010/main" val="947213883"/>
+                <p14:modId xmlns:p14="http://schemas.microsoft.com/office/powerpoint/2010/main" val="1299206488"/>
               </p:ext>
             </p:extLst>
           </p:nvPr>
@@ -6999,7 +6999,7 @@
                     <a:p>
                       <a:r>
                         <a:rPr kumimoji="1" lang="ja-JP" altLang="en-US" sz="1800" dirty="0"/>
-                        <a:t>なし</a:t>
+                        <a:t>メイン画面が表示されている</a:t>
                       </a:r>
                     </a:p>
                   </a:txBody>
@@ -7140,8 +7140,35 @@
                     <a:lstStyle/>
                     <a:p>
                       <a:r>
-                        <a:rPr kumimoji="1" lang="ja-JP" altLang="en-US" sz="1800" dirty="0"/>
-                        <a:t>なし</a:t>
+                        <a:rPr kumimoji="1" lang="en-US" altLang="ja-JP" sz="1800" dirty="0"/>
+                        <a:t>2a. </a:t>
+                      </a:r>
+                      <a:r>
+                        <a:rPr kumimoji="1" lang="ja-JP" altLang="en-US" sz="1800" dirty="0"/>
+                        <a:t>システムが</a:t>
+                      </a:r>
+                      <a:r>
+                        <a:rPr kumimoji="1" lang="en-US" altLang="ja-JP" sz="1800" dirty="0"/>
+                        <a:t>AI</a:t>
+                      </a:r>
+                      <a:r>
+                        <a:rPr kumimoji="1" lang="ja-JP" altLang="en-US" sz="1800" dirty="0"/>
+                        <a:t>との会話画面を表示できない場合</a:t>
+                      </a:r>
+                      <a:endParaRPr kumimoji="1" lang="en-US" altLang="ja-JP" sz="1800" dirty="0"/>
+                    </a:p>
+                    <a:p>
+                      <a:r>
+                        <a:rPr kumimoji="1" lang="ja-JP" altLang="en-US" sz="1800" dirty="0"/>
+                        <a:t>　</a:t>
+                      </a:r>
+                      <a:r>
+                        <a:rPr kumimoji="1" lang="en-US" altLang="ja-JP" sz="1800" dirty="0"/>
+                        <a:t>2a1. </a:t>
+                      </a:r>
+                      <a:r>
+                        <a:rPr kumimoji="1" lang="ja-JP" altLang="en-US" sz="1800" dirty="0"/>
+                        <a:t>エラーメッセージを表示する．</a:t>
                       </a:r>
                       <a:endParaRPr kumimoji="1" lang="en-US" altLang="ja-JP" sz="1800" dirty="0"/>
                     </a:p>
@@ -7203,7 +7230,7 @@
           <p:nvPr>
             <p:extLst>
               <p:ext uri="{D42A27DB-BD31-4B8C-83A1-F6EECF244321}">
-                <p14:modId xmlns:p14="http://schemas.microsoft.com/office/powerpoint/2010/main" val="409779137"/>
+                <p14:modId xmlns:p14="http://schemas.microsoft.com/office/powerpoint/2010/main" val="1892242674"/>
               </p:ext>
             </p:extLst>
           </p:nvPr>
@@ -7367,7 +7394,7 @@
                     <a:p>
                       <a:r>
                         <a:rPr kumimoji="1" lang="ja-JP" altLang="en-US" sz="1800" dirty="0"/>
-                        <a:t>なし</a:t>
+                        <a:t>メイン画面が表示されている</a:t>
                       </a:r>
                     </a:p>
                   </a:txBody>

</xml_diff>